<commit_message>
KP-90 add usecase diagram
</commit_message>
<xml_diff>
--- a/Specification/hirojiren_model_file_advanced.pptx
+++ b/Specification/hirojiren_model_file_advanced.pptx
@@ -6,18 +6,19 @@
     <p:sldMasterId id="2147483653" r:id="rId2"/>
   </p:sldMasterIdLst>
   <p:notesMasterIdLst>
-    <p:notesMasterId r:id="rId9"/>
+    <p:notesMasterId r:id="rId10"/>
   </p:notesMasterIdLst>
   <p:handoutMasterIdLst>
-    <p:handoutMasterId r:id="rId10"/>
+    <p:handoutMasterId r:id="rId11"/>
   </p:handoutMasterIdLst>
   <p:sldIdLst>
     <p:sldId id="258" r:id="rId3"/>
-    <p:sldId id="268" r:id="rId4"/>
-    <p:sldId id="269" r:id="rId5"/>
-    <p:sldId id="271" r:id="rId6"/>
-    <p:sldId id="272" r:id="rId7"/>
-    <p:sldId id="270" r:id="rId8"/>
+    <p:sldId id="273" r:id="rId4"/>
+    <p:sldId id="268" r:id="rId5"/>
+    <p:sldId id="269" r:id="rId6"/>
+    <p:sldId id="271" r:id="rId7"/>
+    <p:sldId id="272" r:id="rId8"/>
+    <p:sldId id="270" r:id="rId9"/>
   </p:sldIdLst>
   <p:sldSz cx="12801600" cy="9601200" type="A3"/>
   <p:notesSz cx="14597063" cy="21107400"/>
@@ -156,6 +157,7 @@
         </p14:section>
         <p14:section name="モデル図ページ（アドバンストクラス）" id="{46087027-09ED-4232-B7C0-C8FBFF40BA2A}">
           <p14:sldIdLst>
+            <p14:sldId id="273"/>
             <p14:sldId id="268"/>
             <p14:sldId id="269"/>
             <p14:sldId id="271"/>
@@ -4651,64 +4653,307 @@
       </p:grpSpPr>
       <p:sp>
         <p:nvSpPr>
-          <p:cNvPr id="5" name="タイトル 4">
+          <p:cNvPr id="4" name="正方形/長方形 3">
             <a:extLst>
               <a:ext uri="{FF2B5EF4-FFF2-40B4-BE49-F238E27FC236}">
-                <a16:creationId xmlns:a16="http://schemas.microsoft.com/office/drawing/2014/main" id="{99E97F26-ED30-4870-B29B-88DD2A395D18}"/>
+                <a16:creationId xmlns:a16="http://schemas.microsoft.com/office/drawing/2014/main" id="{FD76F276-8A63-174B-8450-D2E68742711F}"/>
               </a:ext>
             </a:extLst>
           </p:cNvPr>
-          <p:cNvSpPr>
-            <a:spLocks noGrp="1"/>
-          </p:cNvSpPr>
-          <p:nvPr>
-            <p:ph type="title"/>
-          </p:nvPr>
+          <p:cNvSpPr/>
+          <p:nvPr/>
         </p:nvSpPr>
-        <p:spPr/>
+        <p:spPr>
+          <a:xfrm>
+            <a:off x="352128" y="2208312"/>
+            <a:ext cx="5616624" cy="2016224"/>
+          </a:xfrm>
+          <a:prstGeom prst="rect">
+            <a:avLst/>
+          </a:prstGeom>
+          <a:solidFill>
+            <a:schemeClr val="bg1"/>
+          </a:solidFill>
+          <a:ln>
+            <a:solidFill>
+              <a:schemeClr val="tx1"/>
+            </a:solidFill>
+          </a:ln>
+        </p:spPr>
+        <p:style>
+          <a:lnRef idx="2">
+            <a:schemeClr val="accent1">
+              <a:shade val="50000"/>
+            </a:schemeClr>
+          </a:lnRef>
+          <a:fillRef idx="1">
+            <a:schemeClr val="accent1"/>
+          </a:fillRef>
+          <a:effectRef idx="0">
+            <a:schemeClr val="accent1"/>
+          </a:effectRef>
+          <a:fontRef idx="minor">
+            <a:schemeClr val="lt1"/>
+          </a:fontRef>
+        </p:style>
         <p:txBody>
-          <a:bodyPr/>
+          <a:bodyPr rtlCol="0" anchor="t" anchorCtr="0"/>
           <a:lstStyle/>
           <a:p>
             <a:r>
-              <a:rPr kumimoji="1" lang="ja-JP" altLang="en-US" dirty="0"/>
-              <a:t>要求モデル</a:t>
-            </a:r>
+              <a:rPr lang="ja-JP" altLang="en-US">
+                <a:solidFill>
+                  <a:schemeClr val="tx1"/>
+                </a:solidFill>
+              </a:rPr>
+              <a:t>・モデルの構成では、何をしたかではなく、何を得たのかを書くと内容がわかる構 成になる。例えば目標達成のための要件は何か、抽出した課題は何か、ブロ ックの移動順序や経路の算出方法としてどのような方法をとったのか、設計の方 針の重要なポイントは何か、構造と振舞いの着目すべき箇所はどこか、どのよ な制御戦略をとったのか、などを書く。</a:t>
+            </a:r>
+          </a:p>
+          <a:p>
+            <a:endParaRPr kumimoji="1" lang="ja-JP" altLang="en-US"/>
           </a:p>
         </p:txBody>
       </p:sp>
       <p:sp>
         <p:nvSpPr>
-          <p:cNvPr id="7" name="コンテンツ プレースホルダー 6">
+          <p:cNvPr id="5" name="正方形/長方形 4">
             <a:extLst>
               <a:ext uri="{FF2B5EF4-FFF2-40B4-BE49-F238E27FC236}">
-                <a16:creationId xmlns:a16="http://schemas.microsoft.com/office/drawing/2014/main" id="{43A1BEA2-AA1D-441C-972E-6D458196DA19}"/>
+                <a16:creationId xmlns:a16="http://schemas.microsoft.com/office/drawing/2014/main" id="{66622E1C-032D-3B4F-8DC2-F5DEEACE46A3}"/>
               </a:ext>
             </a:extLst>
           </p:cNvPr>
-          <p:cNvSpPr>
-            <a:spLocks noGrp="1"/>
-          </p:cNvSpPr>
-          <p:nvPr>
-            <p:ph idx="1"/>
-          </p:nvPr>
+          <p:cNvSpPr/>
+          <p:nvPr/>
         </p:nvSpPr>
-        <p:spPr/>
+        <p:spPr>
+          <a:xfrm>
+            <a:off x="424136" y="4440560"/>
+            <a:ext cx="5616624" cy="504056"/>
+          </a:xfrm>
+          <a:prstGeom prst="rect">
+            <a:avLst/>
+          </a:prstGeom>
+          <a:solidFill>
+            <a:schemeClr val="bg1"/>
+          </a:solidFill>
+          <a:ln>
+            <a:solidFill>
+              <a:schemeClr val="tx1"/>
+            </a:solidFill>
+          </a:ln>
+        </p:spPr>
+        <p:style>
+          <a:lnRef idx="2">
+            <a:schemeClr val="accent1">
+              <a:shade val="50000"/>
+            </a:schemeClr>
+          </a:lnRef>
+          <a:fillRef idx="1">
+            <a:schemeClr val="accent1"/>
+          </a:fillRef>
+          <a:effectRef idx="0">
+            <a:schemeClr val="accent1"/>
+          </a:effectRef>
+          <a:fontRef idx="minor">
+            <a:schemeClr val="lt1"/>
+          </a:fontRef>
+        </p:style>
         <p:txBody>
-          <a:bodyPr/>
+          <a:bodyPr rtlCol="0" anchor="t" anchorCtr="0"/>
           <a:lstStyle/>
           <a:p>
             <a:r>
-              <a:rPr kumimoji="1" lang="ja-JP" altLang="en-US" dirty="0"/>
-              <a:t>ここに要求のモデルを書く</a:t>
-            </a:r>
+              <a:rPr lang="ja-JP" altLang="en-US">
+                <a:solidFill>
+                  <a:schemeClr val="tx1"/>
+                </a:solidFill>
+              </a:rPr>
+              <a:t>・抽出した要求に対して妥当性を示す。</a:t>
+            </a:r>
+          </a:p>
+          <a:p>
+            <a:endParaRPr kumimoji="1" lang="ja-JP" altLang="en-US">
+              <a:solidFill>
+                <a:schemeClr val="tx1"/>
+              </a:solidFill>
+            </a:endParaRPr>
           </a:p>
         </p:txBody>
       </p:sp>
+      <p:sp>
+        <p:nvSpPr>
+          <p:cNvPr id="6" name="正方形/長方形 5">
+            <a:extLst>
+              <a:ext uri="{FF2B5EF4-FFF2-40B4-BE49-F238E27FC236}">
+                <a16:creationId xmlns:a16="http://schemas.microsoft.com/office/drawing/2014/main" id="{67F00533-14A5-DB47-BE1A-8DB727E2D87C}"/>
+              </a:ext>
+            </a:extLst>
+          </p:cNvPr>
+          <p:cNvSpPr/>
+          <p:nvPr/>
+        </p:nvSpPr>
+        <p:spPr>
+          <a:xfrm>
+            <a:off x="568152" y="840160"/>
+            <a:ext cx="5616624" cy="504056"/>
+          </a:xfrm>
+          <a:prstGeom prst="rect">
+            <a:avLst/>
+          </a:prstGeom>
+          <a:solidFill>
+            <a:schemeClr val="accent4">
+              <a:lumMod val="20000"/>
+              <a:lumOff val="80000"/>
+            </a:schemeClr>
+          </a:solidFill>
+          <a:ln>
+            <a:solidFill>
+              <a:schemeClr val="tx1"/>
+            </a:solidFill>
+          </a:ln>
+        </p:spPr>
+        <p:style>
+          <a:lnRef idx="2">
+            <a:schemeClr val="accent1">
+              <a:shade val="50000"/>
+            </a:schemeClr>
+          </a:lnRef>
+          <a:fillRef idx="1">
+            <a:schemeClr val="accent1"/>
+          </a:fillRef>
+          <a:effectRef idx="0">
+            <a:schemeClr val="accent1"/>
+          </a:effectRef>
+          <a:fontRef idx="minor">
+            <a:schemeClr val="lt1"/>
+          </a:fontRef>
+        </p:style>
+        <p:txBody>
+          <a:bodyPr rtlCol="0" anchor="ctr" anchorCtr="0"/>
+          <a:lstStyle/>
+          <a:p>
+            <a:pPr algn="ctr"/>
+            <a:r>
+              <a:rPr lang="ja-JP" altLang="en-US" b="1">
+                <a:solidFill>
+                  <a:schemeClr val="tx1"/>
+                </a:solidFill>
+              </a:rPr>
+              <a:t>課題の有効な解き方を示すモデルになっているか</a:t>
+            </a:r>
+            <a:endParaRPr kumimoji="1" lang="ja-JP" altLang="en-US" b="1">
+              <a:solidFill>
+                <a:schemeClr val="tx1"/>
+              </a:solidFill>
+            </a:endParaRPr>
+          </a:p>
+        </p:txBody>
+      </p:sp>
+      <p:sp>
+        <p:nvSpPr>
+          <p:cNvPr id="7" name="正方形/長方形 6">
+            <a:extLst>
+              <a:ext uri="{FF2B5EF4-FFF2-40B4-BE49-F238E27FC236}">
+                <a16:creationId xmlns:a16="http://schemas.microsoft.com/office/drawing/2014/main" id="{28747E7D-A8F9-7C4F-9F9C-4B6AB8082BE4}"/>
+              </a:ext>
+            </a:extLst>
+          </p:cNvPr>
+          <p:cNvSpPr/>
+          <p:nvPr/>
+        </p:nvSpPr>
+        <p:spPr>
+          <a:xfrm>
+            <a:off x="6904856" y="1776264"/>
+            <a:ext cx="3600400" cy="504056"/>
+          </a:xfrm>
+          <a:prstGeom prst="rect">
+            <a:avLst/>
+          </a:prstGeom>
+          <a:solidFill>
+            <a:schemeClr val="accent4">
+              <a:lumMod val="20000"/>
+              <a:lumOff val="80000"/>
+            </a:schemeClr>
+          </a:solidFill>
+          <a:ln>
+            <a:solidFill>
+              <a:schemeClr val="tx1"/>
+            </a:solidFill>
+          </a:ln>
+        </p:spPr>
+        <p:style>
+          <a:lnRef idx="2">
+            <a:schemeClr val="accent1">
+              <a:shade val="50000"/>
+            </a:schemeClr>
+          </a:lnRef>
+          <a:fillRef idx="1">
+            <a:schemeClr val="accent1"/>
+          </a:fillRef>
+          <a:effectRef idx="0">
+            <a:schemeClr val="accent1"/>
+          </a:effectRef>
+          <a:fontRef idx="minor">
+            <a:schemeClr val="lt1"/>
+          </a:fontRef>
+        </p:style>
+        <p:txBody>
+          <a:bodyPr rtlCol="0" anchor="ctr" anchorCtr="0"/>
+          <a:lstStyle/>
+          <a:p>
+            <a:pPr algn="ctr"/>
+            <a:r>
+              <a:rPr kumimoji="1" lang="ja-JP" altLang="en-US" b="1">
+                <a:solidFill>
+                  <a:schemeClr val="tx1"/>
+                </a:solidFill>
+              </a:rPr>
+              <a:t>画像処理を活用しているか</a:t>
+            </a:r>
+          </a:p>
+        </p:txBody>
+      </p:sp>
+      <p:pic>
+        <p:nvPicPr>
+          <p:cNvPr id="9" name="図 8">
+            <a:extLst>
+              <a:ext uri="{FF2B5EF4-FFF2-40B4-BE49-F238E27FC236}">
+                <a16:creationId xmlns:a16="http://schemas.microsoft.com/office/drawing/2014/main" id="{E6A5D4D2-048D-AB44-9A71-CB0ACD021824}"/>
+              </a:ext>
+            </a:extLst>
+          </p:cNvPr>
+          <p:cNvPicPr>
+            <a:picLocks noChangeAspect="1"/>
+          </p:cNvPicPr>
+          <p:nvPr/>
+        </p:nvPicPr>
+        <p:blipFill>
+          <a:blip r:embed="rId2">
+            <a:extLst>
+              <a:ext uri="{28A0092B-C50C-407E-A947-70E740481C1C}">
+                <a14:useLocalDpi xmlns:a14="http://schemas.microsoft.com/office/drawing/2010/main" val="0"/>
+              </a:ext>
+            </a:extLst>
+          </a:blip>
+          <a:stretch>
+            <a:fillRect/>
+          </a:stretch>
+        </p:blipFill>
+        <p:spPr>
+          <a:xfrm>
+            <a:off x="4528592" y="5085833"/>
+            <a:ext cx="7834536" cy="4433724"/>
+          </a:xfrm>
+          <a:prstGeom prst="rect">
+            <a:avLst/>
+          </a:prstGeom>
+        </p:spPr>
+      </p:pic>
     </p:spTree>
     <p:extLst>
       <p:ext uri="{BB962C8B-B14F-4D97-AF65-F5344CB8AC3E}">
-        <p14:creationId xmlns:p14="http://schemas.microsoft.com/office/powerpoint/2010/main" val="1808364849"/>
+        <p14:creationId xmlns:p14="http://schemas.microsoft.com/office/powerpoint/2010/main" val="157841675"/>
       </p:ext>
     </p:extLst>
   </p:cSld>
@@ -4737,10 +4982,10 @@
       </p:grpSpPr>
       <p:sp>
         <p:nvSpPr>
-          <p:cNvPr id="2" name="タイトル 1">
+          <p:cNvPr id="5" name="タイトル 4">
             <a:extLst>
               <a:ext uri="{FF2B5EF4-FFF2-40B4-BE49-F238E27FC236}">
-                <a16:creationId xmlns:a16="http://schemas.microsoft.com/office/drawing/2014/main" id="{E6440250-F656-44C9-902A-E623DA03BB80}"/>
+                <a16:creationId xmlns:a16="http://schemas.microsoft.com/office/drawing/2014/main" id="{99E97F26-ED30-4870-B29B-88DD2A395D18}"/>
               </a:ext>
             </a:extLst>
           </p:cNvPr>
@@ -4757,22 +5002,18 @@
           <a:lstStyle/>
           <a:p>
             <a:r>
-              <a:rPr lang="ja-JP" altLang="en-US" dirty="0"/>
-              <a:t>分析</a:t>
-            </a:r>
-            <a:r>
               <a:rPr kumimoji="1" lang="ja-JP" altLang="en-US" dirty="0"/>
-              <a:t>モデル</a:t>
+              <a:t>要求モデル</a:t>
             </a:r>
           </a:p>
         </p:txBody>
       </p:sp>
       <p:sp>
         <p:nvSpPr>
-          <p:cNvPr id="6" name="コンテンツ プレースホルダー 5">
+          <p:cNvPr id="7" name="コンテンツ プレースホルダー 6">
             <a:extLst>
               <a:ext uri="{FF2B5EF4-FFF2-40B4-BE49-F238E27FC236}">
-                <a16:creationId xmlns:a16="http://schemas.microsoft.com/office/drawing/2014/main" id="{26FAAD07-F302-42C1-85D9-C09DAB46A420}"/>
+                <a16:creationId xmlns:a16="http://schemas.microsoft.com/office/drawing/2014/main" id="{43A1BEA2-AA1D-441C-972E-6D458196DA19}"/>
               </a:ext>
             </a:extLst>
           </p:cNvPr>
@@ -4790,20 +5031,123 @@
           <a:p>
             <a:r>
               <a:rPr kumimoji="1" lang="ja-JP" altLang="en-US" dirty="0"/>
-              <a:t>ここに分析の</a:t>
-            </a:r>
-            <a:r>
-              <a:rPr lang="ja-JP" altLang="en-US" dirty="0"/>
-              <a:t>モデルを書く</a:t>
-            </a:r>
-            <a:endParaRPr kumimoji="1" lang="en-US" altLang="ja-JP" dirty="0"/>
+              <a:t>ここに要求のモデルを書く</a:t>
+            </a:r>
           </a:p>
         </p:txBody>
       </p:sp>
+      <p:pic>
+        <p:nvPicPr>
+          <p:cNvPr id="9" name="図 8">
+            <a:extLst>
+              <a:ext uri="{FF2B5EF4-FFF2-40B4-BE49-F238E27FC236}">
+                <a16:creationId xmlns:a16="http://schemas.microsoft.com/office/drawing/2014/main" id="{8A38697B-A4D1-BE49-8CD6-DDCDEF3F7F5C}"/>
+              </a:ext>
+            </a:extLst>
+          </p:cNvPr>
+          <p:cNvPicPr>
+            <a:picLocks noChangeAspect="1"/>
+          </p:cNvPicPr>
+          <p:nvPr/>
+        </p:nvPicPr>
+        <p:blipFill>
+          <a:blip r:embed="rId2">
+            <a:extLst>
+              <a:ext uri="{28A0092B-C50C-407E-A947-70E740481C1C}">
+                <a14:useLocalDpi xmlns:a14="http://schemas.microsoft.com/office/drawing/2010/main" val="0"/>
+              </a:ext>
+            </a:extLst>
+          </a:blip>
+          <a:stretch>
+            <a:fillRect/>
+          </a:stretch>
+        </p:blipFill>
+        <p:spPr>
+          <a:xfrm>
+            <a:off x="654050" y="1992288"/>
+            <a:ext cx="11493500" cy="2019300"/>
+          </a:xfrm>
+          <a:prstGeom prst="rect">
+            <a:avLst/>
+          </a:prstGeom>
+        </p:spPr>
+      </p:pic>
+      <p:pic>
+        <p:nvPicPr>
+          <p:cNvPr id="11" name="図 10">
+            <a:extLst>
+              <a:ext uri="{FF2B5EF4-FFF2-40B4-BE49-F238E27FC236}">
+                <a16:creationId xmlns:a16="http://schemas.microsoft.com/office/drawing/2014/main" id="{EF5F6C50-A3BA-384D-898B-6E0659AAB45D}"/>
+              </a:ext>
+            </a:extLst>
+          </p:cNvPr>
+          <p:cNvPicPr>
+            <a:picLocks noChangeAspect="1"/>
+          </p:cNvPicPr>
+          <p:nvPr/>
+        </p:nvPicPr>
+        <p:blipFill>
+          <a:blip r:embed="rId3">
+            <a:extLst>
+              <a:ext uri="{28A0092B-C50C-407E-A947-70E740481C1C}">
+                <a14:useLocalDpi xmlns:a14="http://schemas.microsoft.com/office/drawing/2010/main" val="0"/>
+              </a:ext>
+            </a:extLst>
+          </a:blip>
+          <a:stretch>
+            <a:fillRect/>
+          </a:stretch>
+        </p:blipFill>
+        <p:spPr>
+          <a:xfrm>
+            <a:off x="1206500" y="3968750"/>
+            <a:ext cx="10388600" cy="1663700"/>
+          </a:xfrm>
+          <a:prstGeom prst="rect">
+            <a:avLst/>
+          </a:prstGeom>
+        </p:spPr>
+      </p:pic>
+      <p:pic>
+        <p:nvPicPr>
+          <p:cNvPr id="13" name="図 12">
+            <a:extLst>
+              <a:ext uri="{FF2B5EF4-FFF2-40B4-BE49-F238E27FC236}">
+                <a16:creationId xmlns:a16="http://schemas.microsoft.com/office/drawing/2014/main" id="{19E5FDC0-1C12-C84B-A89C-32B528A96C06}"/>
+              </a:ext>
+            </a:extLst>
+          </p:cNvPr>
+          <p:cNvPicPr>
+            <a:picLocks noChangeAspect="1"/>
+          </p:cNvPicPr>
+          <p:nvPr/>
+        </p:nvPicPr>
+        <p:blipFill>
+          <a:blip r:embed="rId4">
+            <a:extLst>
+              <a:ext uri="{28A0092B-C50C-407E-A947-70E740481C1C}">
+                <a14:useLocalDpi xmlns:a14="http://schemas.microsoft.com/office/drawing/2010/main" val="0"/>
+              </a:ext>
+            </a:extLst>
+          </a:blip>
+          <a:stretch>
+            <a:fillRect/>
+          </a:stretch>
+        </p:blipFill>
+        <p:spPr>
+          <a:xfrm>
+            <a:off x="1072208" y="6024736"/>
+            <a:ext cx="6794996" cy="3375673"/>
+          </a:xfrm>
+          <a:prstGeom prst="rect">
+            <a:avLst/>
+          </a:prstGeom>
+        </p:spPr>
+      </p:pic>
     </p:spTree>
     <p:extLst>
       <p:ext uri="{BB962C8B-B14F-4D97-AF65-F5344CB8AC3E}">
-        <p14:creationId xmlns:p14="http://schemas.microsoft.com/office/powerpoint/2010/main" val="3115111520"/>
+        <p14:creationId xmlns:p14="http://schemas.microsoft.com/office/powerpoint/2010/main" val="1808364849"/>
       </p:ext>
     </p:extLst>
   </p:cSld>
@@ -4857,13 +5201,8 @@
             </a:r>
             <a:r>
               <a:rPr kumimoji="1" lang="ja-JP" altLang="en-US" dirty="0"/>
-              <a:t>モデルまたは</a:t>
-            </a:r>
-            <a:r>
-              <a:rPr lang="ja-JP" altLang="en-US" dirty="0"/>
-              <a:t>設計モデル</a:t>
-            </a:r>
-            <a:endParaRPr kumimoji="1" lang="ja-JP" altLang="en-US" dirty="0"/>
+              <a:t>モデル</a:t>
+            </a:r>
           </a:p>
         </p:txBody>
       </p:sp>
@@ -4894,24 +5233,152 @@
             </a:r>
             <a:r>
               <a:rPr lang="ja-JP" altLang="en-US" dirty="0"/>
-              <a:t>モデルまたは設計のモデルを書く</a:t>
-            </a:r>
-            <a:endParaRPr lang="en-US" altLang="ja-JP" dirty="0"/>
-          </a:p>
-          <a:p>
-            <a:pPr lvl="1"/>
-            <a:r>
-              <a:rPr lang="ja-JP" altLang="en-US" dirty="0"/>
-              <a:t>このページは、分析と設計のどちらかに使うことも、分析と設計の両方に使うこともできる</a:t>
+              <a:t>モデルを書く</a:t>
             </a:r>
             <a:endParaRPr kumimoji="1" lang="en-US" altLang="ja-JP" dirty="0"/>
           </a:p>
         </p:txBody>
       </p:sp>
+      <p:sp>
+        <p:nvSpPr>
+          <p:cNvPr id="4" name="正方形/長方形 3">
+            <a:extLst>
+              <a:ext uri="{FF2B5EF4-FFF2-40B4-BE49-F238E27FC236}">
+                <a16:creationId xmlns:a16="http://schemas.microsoft.com/office/drawing/2014/main" id="{E0CC81E8-34DC-B24C-86ED-5CAC9E65E2B7}"/>
+              </a:ext>
+            </a:extLst>
+          </p:cNvPr>
+          <p:cNvSpPr/>
+          <p:nvPr/>
+        </p:nvSpPr>
+        <p:spPr>
+          <a:xfrm>
+            <a:off x="3808512" y="4152528"/>
+            <a:ext cx="3600400" cy="504056"/>
+          </a:xfrm>
+          <a:prstGeom prst="rect">
+            <a:avLst/>
+          </a:prstGeom>
+          <a:solidFill>
+            <a:schemeClr val="accent4">
+              <a:lumMod val="20000"/>
+              <a:lumOff val="80000"/>
+            </a:schemeClr>
+          </a:solidFill>
+          <a:ln>
+            <a:solidFill>
+              <a:schemeClr val="tx1"/>
+            </a:solidFill>
+          </a:ln>
+        </p:spPr>
+        <p:style>
+          <a:lnRef idx="2">
+            <a:schemeClr val="accent1">
+              <a:shade val="50000"/>
+            </a:schemeClr>
+          </a:lnRef>
+          <a:fillRef idx="1">
+            <a:schemeClr val="accent1"/>
+          </a:fillRef>
+          <a:effectRef idx="0">
+            <a:schemeClr val="accent1"/>
+          </a:effectRef>
+          <a:fontRef idx="minor">
+            <a:schemeClr val="lt1"/>
+          </a:fontRef>
+        </p:style>
+        <p:txBody>
+          <a:bodyPr rtlCol="0" anchor="ctr" anchorCtr="0"/>
+          <a:lstStyle/>
+          <a:p>
+            <a:pPr algn="ctr"/>
+            <a:r>
+              <a:rPr kumimoji="1" lang="ja-JP" altLang="en-US" b="1">
+                <a:solidFill>
+                  <a:schemeClr val="tx1"/>
+                </a:solidFill>
+              </a:rPr>
+              <a:t>ブロックビンゴゲームエリア</a:t>
+            </a:r>
+          </a:p>
+        </p:txBody>
+      </p:sp>
+      <p:pic>
+        <p:nvPicPr>
+          <p:cNvPr id="5" name="図 4">
+            <a:extLst>
+              <a:ext uri="{FF2B5EF4-FFF2-40B4-BE49-F238E27FC236}">
+                <a16:creationId xmlns:a16="http://schemas.microsoft.com/office/drawing/2014/main" id="{F92D5C46-433A-F441-8049-FE7F464C2B2E}"/>
+              </a:ext>
+            </a:extLst>
+          </p:cNvPr>
+          <p:cNvPicPr>
+            <a:picLocks noChangeAspect="1"/>
+          </p:cNvPicPr>
+          <p:nvPr/>
+        </p:nvPicPr>
+        <p:blipFill>
+          <a:blip r:embed="rId2">
+            <a:extLst>
+              <a:ext uri="{28A0092B-C50C-407E-A947-70E740481C1C}">
+                <a14:useLocalDpi xmlns:a14="http://schemas.microsoft.com/office/drawing/2010/main" val="0"/>
+              </a:ext>
+            </a:extLst>
+          </a:blip>
+          <a:stretch>
+            <a:fillRect/>
+          </a:stretch>
+        </p:blipFill>
+        <p:spPr>
+          <a:xfrm>
+            <a:off x="2008312" y="2064296"/>
+            <a:ext cx="11531600" cy="1168400"/>
+          </a:xfrm>
+          <a:prstGeom prst="rect">
+            <a:avLst/>
+          </a:prstGeom>
+        </p:spPr>
+      </p:pic>
+      <p:pic>
+        <p:nvPicPr>
+          <p:cNvPr id="8" name="図 7">
+            <a:extLst>
+              <a:ext uri="{FF2B5EF4-FFF2-40B4-BE49-F238E27FC236}">
+                <a16:creationId xmlns:a16="http://schemas.microsoft.com/office/drawing/2014/main" id="{9B1CB5E3-CA15-1240-972F-837554C71DD7}"/>
+              </a:ext>
+            </a:extLst>
+          </p:cNvPr>
+          <p:cNvPicPr>
+            <a:picLocks noChangeAspect="1"/>
+          </p:cNvPicPr>
+          <p:nvPr/>
+        </p:nvPicPr>
+        <p:blipFill>
+          <a:blip r:embed="rId3">
+            <a:extLst>
+              <a:ext uri="{28A0092B-C50C-407E-A947-70E740481C1C}">
+                <a14:useLocalDpi xmlns:a14="http://schemas.microsoft.com/office/drawing/2010/main" val="0"/>
+              </a:ext>
+            </a:extLst>
+          </a:blip>
+          <a:stretch>
+            <a:fillRect/>
+          </a:stretch>
+        </p:blipFill>
+        <p:spPr>
+          <a:xfrm>
+            <a:off x="533400" y="5219424"/>
+            <a:ext cx="6011416" cy="3994599"/>
+          </a:xfrm>
+          <a:prstGeom prst="rect">
+            <a:avLst/>
+          </a:prstGeom>
+        </p:spPr>
+      </p:pic>
     </p:spTree>
     <p:extLst>
       <p:ext uri="{BB962C8B-B14F-4D97-AF65-F5344CB8AC3E}">
-        <p14:creationId xmlns:p14="http://schemas.microsoft.com/office/powerpoint/2010/main" val="3593560833"/>
+        <p14:creationId xmlns:p14="http://schemas.microsoft.com/office/powerpoint/2010/main" val="3115111520"/>
       </p:ext>
     </p:extLst>
   </p:cSld>
@@ -4961,6 +5428,14 @@
           <a:p>
             <a:r>
               <a:rPr lang="ja-JP" altLang="en-US" dirty="0"/>
+              <a:t>分析</a:t>
+            </a:r>
+            <a:r>
+              <a:rPr kumimoji="1" lang="ja-JP" altLang="en-US" dirty="0"/>
+              <a:t>モデルまたは</a:t>
+            </a:r>
+            <a:r>
+              <a:rPr lang="ja-JP" altLang="en-US" dirty="0"/>
               <a:t>設計モデル</a:t>
             </a:r>
             <a:endParaRPr kumimoji="1" lang="ja-JP" altLang="en-US" dirty="0"/>
@@ -4990,6 +5465,106 @@
           <a:p>
             <a:r>
               <a:rPr kumimoji="1" lang="ja-JP" altLang="en-US" dirty="0"/>
+              <a:t>ここに分析の</a:t>
+            </a:r>
+            <a:r>
+              <a:rPr lang="ja-JP" altLang="en-US" dirty="0"/>
+              <a:t>モデルまたは設計のモデルを書く</a:t>
+            </a:r>
+            <a:endParaRPr lang="en-US" altLang="ja-JP" dirty="0"/>
+          </a:p>
+          <a:p>
+            <a:pPr lvl="1"/>
+            <a:r>
+              <a:rPr lang="ja-JP" altLang="en-US" dirty="0"/>
+              <a:t>このページは、分析と設計のどちらかに使うことも、分析と設計の両方に使うこともできる</a:t>
+            </a:r>
+            <a:endParaRPr kumimoji="1" lang="en-US" altLang="ja-JP" dirty="0"/>
+          </a:p>
+        </p:txBody>
+      </p:sp>
+    </p:spTree>
+    <p:extLst>
+      <p:ext uri="{BB962C8B-B14F-4D97-AF65-F5344CB8AC3E}">
+        <p14:creationId xmlns:p14="http://schemas.microsoft.com/office/powerpoint/2010/main" val="3593560833"/>
+      </p:ext>
+    </p:extLst>
+  </p:cSld>
+  <p:clrMapOvr>
+    <a:masterClrMapping/>
+  </p:clrMapOvr>
+</p:sld>
+</file>
+
+<file path=ppt/slides/slide6.xml><?xml version="1.0" encoding="utf-8"?>
+<p:sld xmlns:a="http://schemas.openxmlformats.org/drawingml/2006/main" xmlns:r="http://schemas.openxmlformats.org/officeDocument/2006/relationships" xmlns:p="http://schemas.openxmlformats.org/presentationml/2006/main">
+  <p:cSld>
+    <p:spTree>
+      <p:nvGrpSpPr>
+        <p:cNvPr id="1" name=""/>
+        <p:cNvGrpSpPr/>
+        <p:nvPr/>
+      </p:nvGrpSpPr>
+      <p:grpSpPr>
+        <a:xfrm>
+          <a:off x="0" y="0"/>
+          <a:ext cx="0" cy="0"/>
+          <a:chOff x="0" y="0"/>
+          <a:chExt cx="0" cy="0"/>
+        </a:xfrm>
+      </p:grpSpPr>
+      <p:sp>
+        <p:nvSpPr>
+          <p:cNvPr id="2" name="タイトル 1">
+            <a:extLst>
+              <a:ext uri="{FF2B5EF4-FFF2-40B4-BE49-F238E27FC236}">
+                <a16:creationId xmlns:a16="http://schemas.microsoft.com/office/drawing/2014/main" id="{E6440250-F656-44C9-902A-E623DA03BB80}"/>
+              </a:ext>
+            </a:extLst>
+          </p:cNvPr>
+          <p:cNvSpPr>
+            <a:spLocks noGrp="1"/>
+          </p:cNvSpPr>
+          <p:nvPr>
+            <p:ph type="title"/>
+          </p:nvPr>
+        </p:nvSpPr>
+        <p:spPr/>
+        <p:txBody>
+          <a:bodyPr/>
+          <a:lstStyle/>
+          <a:p>
+            <a:r>
+              <a:rPr lang="ja-JP" altLang="en-US" dirty="0"/>
+              <a:t>設計モデル</a:t>
+            </a:r>
+            <a:endParaRPr kumimoji="1" lang="ja-JP" altLang="en-US" dirty="0"/>
+          </a:p>
+        </p:txBody>
+      </p:sp>
+      <p:sp>
+        <p:nvSpPr>
+          <p:cNvPr id="6" name="コンテンツ プレースホルダー 5">
+            <a:extLst>
+              <a:ext uri="{FF2B5EF4-FFF2-40B4-BE49-F238E27FC236}">
+                <a16:creationId xmlns:a16="http://schemas.microsoft.com/office/drawing/2014/main" id="{26FAAD07-F302-42C1-85D9-C09DAB46A420}"/>
+              </a:ext>
+            </a:extLst>
+          </p:cNvPr>
+          <p:cNvSpPr>
+            <a:spLocks noGrp="1"/>
+          </p:cNvSpPr>
+          <p:nvPr>
+            <p:ph idx="1"/>
+          </p:nvPr>
+        </p:nvSpPr>
+        <p:spPr/>
+        <p:txBody>
+          <a:bodyPr/>
+          <a:lstStyle/>
+          <a:p>
+            <a:r>
+              <a:rPr kumimoji="1" lang="ja-JP" altLang="en-US" dirty="0"/>
               <a:t>ここに</a:t>
             </a:r>
             <a:r>
@@ -5000,6 +5575,42 @@
           </a:p>
         </p:txBody>
       </p:sp>
+      <p:pic>
+        <p:nvPicPr>
+          <p:cNvPr id="4" name="図 3">
+            <a:extLst>
+              <a:ext uri="{FF2B5EF4-FFF2-40B4-BE49-F238E27FC236}">
+                <a16:creationId xmlns:a16="http://schemas.microsoft.com/office/drawing/2014/main" id="{37BC52CD-ED30-9043-888B-9BDA2F47AEE1}"/>
+              </a:ext>
+            </a:extLst>
+          </p:cNvPr>
+          <p:cNvPicPr>
+            <a:picLocks noChangeAspect="1"/>
+          </p:cNvPicPr>
+          <p:nvPr/>
+        </p:nvPicPr>
+        <p:blipFill>
+          <a:blip r:embed="rId2">
+            <a:extLst>
+              <a:ext uri="{28A0092B-C50C-407E-A947-70E740481C1C}">
+                <a14:useLocalDpi xmlns:a14="http://schemas.microsoft.com/office/drawing/2010/main" val="0"/>
+              </a:ext>
+            </a:extLst>
+          </a:blip>
+          <a:stretch>
+            <a:fillRect/>
+          </a:stretch>
+        </p:blipFill>
+        <p:spPr>
+          <a:xfrm>
+            <a:off x="654050" y="4210050"/>
+            <a:ext cx="11493500" cy="1181100"/>
+          </a:xfrm>
+          <a:prstGeom prst="rect">
+            <a:avLst/>
+          </a:prstGeom>
+        </p:spPr>
+      </p:pic>
     </p:spTree>
     <p:extLst>
       <p:ext uri="{BB962C8B-B14F-4D97-AF65-F5344CB8AC3E}">
@@ -5013,7 +5624,7 @@
 </p:sld>
 </file>
 
-<file path=ppt/slides/slide6.xml><?xml version="1.0" encoding="utf-8"?>
+<file path=ppt/slides/slide7.xml><?xml version="1.0" encoding="utf-8"?>
 <p:sld xmlns:a="http://schemas.openxmlformats.org/drawingml/2006/main" xmlns:r="http://schemas.openxmlformats.org/officeDocument/2006/relationships" xmlns:p="http://schemas.openxmlformats.org/presentationml/2006/main">
   <p:cSld>
     <p:spTree>
@@ -5094,6 +5705,42 @@
           </a:p>
         </p:txBody>
       </p:sp>
+      <p:pic>
+        <p:nvPicPr>
+          <p:cNvPr id="4" name="図 3">
+            <a:extLst>
+              <a:ext uri="{FF2B5EF4-FFF2-40B4-BE49-F238E27FC236}">
+                <a16:creationId xmlns:a16="http://schemas.microsoft.com/office/drawing/2014/main" id="{BDB4E4C0-F86E-4849-8FA5-47AC040E7A27}"/>
+              </a:ext>
+            </a:extLst>
+          </p:cNvPr>
+          <p:cNvPicPr>
+            <a:picLocks noChangeAspect="1"/>
+          </p:cNvPicPr>
+          <p:nvPr/>
+        </p:nvPicPr>
+        <p:blipFill>
+          <a:blip r:embed="rId2">
+            <a:extLst>
+              <a:ext uri="{28A0092B-C50C-407E-A947-70E740481C1C}">
+                <a14:useLocalDpi xmlns:a14="http://schemas.microsoft.com/office/drawing/2010/main" val="0"/>
+              </a:ext>
+            </a:extLst>
+          </a:blip>
+          <a:stretch>
+            <a:fillRect/>
+          </a:stretch>
+        </p:blipFill>
+        <p:spPr>
+          <a:xfrm>
+            <a:off x="654050" y="4146550"/>
+            <a:ext cx="11493500" cy="1308100"/>
+          </a:xfrm>
+          <a:prstGeom prst="rect">
+            <a:avLst/>
+          </a:prstGeom>
+        </p:spPr>
+      </p:pic>
     </p:spTree>
     <p:extLst>
       <p:ext uri="{BB962C8B-B14F-4D97-AF65-F5344CB8AC3E}">

</xml_diff>